<commit_message>
product insert display completed
</commit_message>
<xml_diff>
--- a/Project_documents/PPT/SMT_1.pptx
+++ b/Project_documents/PPT/SMT_1.pptx
@@ -283,7 +283,7 @@
               <a:pPr>
                 <a:defRPr/>
               </a:pPr>
-              <a:t>3 January 2025</a:t>
+              <a:t>4 January 2025</a:t>
             </a:fld>
             <a:endParaRPr lang="en-IN" dirty="0"/>
           </a:p>
@@ -495,7 +495,7 @@
               <a:pPr>
                 <a:defRPr/>
               </a:pPr>
-              <a:t>3 January 2025</a:t>
+              <a:t>4 January 2025</a:t>
             </a:fld>
             <a:endParaRPr lang="en-US" dirty="0"/>
           </a:p>
@@ -896,7 +896,7 @@
               <a:pPr>
                 <a:defRPr/>
               </a:pPr>
-              <a:t>3 January 2025</a:t>
+              <a:t>4 January 2025</a:t>
             </a:fld>
             <a:endParaRPr lang="en-US" dirty="0"/>
           </a:p>
@@ -1410,7 +1410,7 @@
               <a:pPr>
                 <a:defRPr/>
               </a:pPr>
-              <a:t>3-Jan-25</a:t>
+              <a:t>4-Jan-25</a:t>
             </a:fld>
             <a:endParaRPr lang="en-US" dirty="0"/>
           </a:p>
@@ -1575,7 +1575,7 @@
               <a:pPr>
                 <a:defRPr/>
               </a:pPr>
-              <a:t>3-Jan-25</a:t>
+              <a:t>4-Jan-25</a:t>
             </a:fld>
             <a:endParaRPr lang="en-US" dirty="0"/>
           </a:p>
@@ -1750,7 +1750,7 @@
               <a:pPr>
                 <a:defRPr/>
               </a:pPr>
-              <a:t>3-Jan-25</a:t>
+              <a:t>4-Jan-25</a:t>
             </a:fld>
             <a:endParaRPr lang="en-US" dirty="0"/>
           </a:p>
@@ -1860,7 +1860,7 @@
               <a:pPr>
                 <a:defRPr/>
               </a:pPr>
-              <a:t>3-Jan-25</a:t>
+              <a:t>4-Jan-25</a:t>
             </a:fld>
             <a:endParaRPr lang="en-US" dirty="0"/>
           </a:p>
@@ -2084,7 +2084,7 @@
             <a:fld id="{34E9FD4F-3980-456F-B545-8D53309EA37E}" type="datetime5">
               <a:rPr lang="en-US" smtClean="0"/>
               <a:pPr/>
-              <a:t>3-Jan-25</a:t>
+              <a:t>4-Jan-25</a:t>
             </a:fld>
             <a:endParaRPr lang="en-US" dirty="0"/>
           </a:p>
@@ -2233,7 +2233,7 @@
             <a:fld id="{D535EB8F-F371-4484-A84C-21A1B01158C7}" type="datetime5">
               <a:rPr lang="en-US" smtClean="0"/>
               <a:pPr/>
-              <a:t>3-Jan-25</a:t>
+              <a:t>4-Jan-25</a:t>
             </a:fld>
             <a:endParaRPr lang="en-US" dirty="0"/>
           </a:p>
@@ -2459,7 +2459,7 @@
             <a:fld id="{D2C979A4-C0B2-4C81-A4FB-1E5B80AD0B49}" type="datetime5">
               <a:rPr lang="en-US" smtClean="0"/>
               <a:pPr/>
-              <a:t>3-Jan-25</a:t>
+              <a:t>4-Jan-25</a:t>
             </a:fld>
             <a:endParaRPr lang="en-US" dirty="0"/>
           </a:p>
@@ -2752,7 +2752,7 @@
             <a:fld id="{3BDE2897-C65B-406D-A588-744D383CA7DE}" type="datetime5">
               <a:rPr lang="en-US" smtClean="0"/>
               <a:pPr/>
-              <a:t>3-Jan-25</a:t>
+              <a:t>4-Jan-25</a:t>
             </a:fld>
             <a:endParaRPr lang="en-US" dirty="0"/>
           </a:p>
@@ -3152,7 +3152,7 @@
             <a:fld id="{973F1FA1-8458-4129-924B-7532EDD86147}" type="datetime5">
               <a:rPr lang="en-US" smtClean="0"/>
               <a:pPr/>
-              <a:t>3-Jan-25</a:t>
+              <a:t>4-Jan-25</a:t>
             </a:fld>
             <a:endParaRPr lang="en-US" dirty="0"/>
           </a:p>
@@ -3250,7 +3250,7 @@
             <a:fld id="{445FE24D-4434-424D-9C75-6E46573DFD75}" type="datetime5">
               <a:rPr lang="en-US" smtClean="0"/>
               <a:pPr/>
-              <a:t>3-Jan-25</a:t>
+              <a:t>4-Jan-25</a:t>
             </a:fld>
             <a:endParaRPr lang="en-US" dirty="0"/>
           </a:p>
@@ -3326,7 +3326,7 @@
             <a:fld id="{6A12F143-239B-42CE-BE0F-55E3CD594915}" type="datetime5">
               <a:rPr lang="en-US" smtClean="0"/>
               <a:pPr/>
-              <a:t>3-Jan-25</a:t>
+              <a:t>4-Jan-25</a:t>
             </a:fld>
             <a:endParaRPr lang="en-US" dirty="0"/>
           </a:p>
@@ -3484,7 +3484,7 @@
               <a:pPr>
                 <a:defRPr/>
               </a:pPr>
-              <a:t>3-Jan-25</a:t>
+              <a:t>4-Jan-25</a:t>
             </a:fld>
             <a:endParaRPr lang="en-US" dirty="0"/>
           </a:p>
@@ -3747,7 +3747,7 @@
             <a:fld id="{19EAD920-F682-4A55-B63F-48C8F1CC1283}" type="datetime5">
               <a:rPr lang="en-US" smtClean="0"/>
               <a:pPr/>
-              <a:t>3-Jan-25</a:t>
+              <a:t>4-Jan-25</a:t>
             </a:fld>
             <a:endParaRPr lang="en-US" dirty="0"/>
           </a:p>
@@ -3980,7 +3980,7 @@
             <a:fld id="{8E917B04-B5F9-4630-A128-87B4B92EA18E}" type="datetime5">
               <a:rPr lang="en-US" smtClean="0"/>
               <a:pPr/>
-              <a:t>3-Jan-25</a:t>
+              <a:t>4-Jan-25</a:t>
             </a:fld>
             <a:endParaRPr lang="en-US" dirty="0"/>
           </a:p>
@@ -4129,7 +4129,7 @@
             <a:fld id="{8E73A310-130A-439C-B3E5-0906939592AC}" type="datetime5">
               <a:rPr lang="en-US" smtClean="0"/>
               <a:pPr/>
-              <a:t>3-Jan-25</a:t>
+              <a:t>4-Jan-25</a:t>
             </a:fld>
             <a:endParaRPr lang="en-US" dirty="0"/>
           </a:p>
@@ -4288,7 +4288,7 @@
             <a:fld id="{350FB05B-E5CC-4464-9BB7-7BCCF84A07E4}" type="datetime5">
               <a:rPr lang="en-US" smtClean="0"/>
               <a:pPr/>
-              <a:t>3-Jan-25</a:t>
+              <a:t>4-Jan-25</a:t>
             </a:fld>
             <a:endParaRPr lang="en-US" dirty="0"/>
           </a:p>
@@ -4482,7 +4482,7 @@
             <a:fld id="{48A573B2-5186-4EA1-B709-D1438BA10970}" type="datetime5">
               <a:rPr lang="en-US" smtClean="0"/>
               <a:pPr/>
-              <a:t>3-Jan-25</a:t>
+              <a:t>4-Jan-25</a:t>
             </a:fld>
             <a:endParaRPr lang="en-US" dirty="0"/>
           </a:p>
@@ -4631,7 +4631,7 @@
             <a:fld id="{BDE5369F-A3ED-4071-A75D-258CD23F1EC5}" type="datetime5">
               <a:rPr lang="en-US" smtClean="0"/>
               <a:pPr/>
-              <a:t>3-Jan-25</a:t>
+              <a:t>4-Jan-25</a:t>
             </a:fld>
             <a:endParaRPr lang="en-US" dirty="0"/>
           </a:p>
@@ -4857,7 +4857,7 @@
             <a:fld id="{1DE2E41D-AD20-4582-96A9-26AE005D4E42}" type="datetime5">
               <a:rPr lang="en-US" smtClean="0"/>
               <a:pPr/>
-              <a:t>3-Jan-25</a:t>
+              <a:t>4-Jan-25</a:t>
             </a:fld>
             <a:endParaRPr lang="en-US" dirty="0"/>
           </a:p>
@@ -5123,7 +5123,7 @@
             <a:fld id="{6EA145C0-2AC4-4702-9C85-BED29F3D5C77}" type="datetime5">
               <a:rPr lang="en-US" smtClean="0"/>
               <a:pPr/>
-              <a:t>3-Jan-25</a:t>
+              <a:t>4-Jan-25</a:t>
             </a:fld>
             <a:endParaRPr lang="en-US" dirty="0"/>
           </a:p>
@@ -5523,7 +5523,7 @@
             <a:fld id="{93198E6B-3CEE-468F-BE48-CC50E9D8E64E}" type="datetime5">
               <a:rPr lang="en-US" smtClean="0"/>
               <a:pPr/>
-              <a:t>3-Jan-25</a:t>
+              <a:t>4-Jan-25</a:t>
             </a:fld>
             <a:endParaRPr lang="en-US" dirty="0"/>
           </a:p>
@@ -5621,7 +5621,7 @@
             <a:fld id="{52FACE50-1432-4FE3-B49C-8A04528B6EFC}" type="datetime5">
               <a:rPr lang="en-US" smtClean="0"/>
               <a:pPr/>
-              <a:t>3-Jan-25</a:t>
+              <a:t>4-Jan-25</a:t>
             </a:fld>
             <a:endParaRPr lang="en-US" dirty="0"/>
           </a:p>
@@ -5852,7 +5852,7 @@
               <a:pPr>
                 <a:defRPr/>
               </a:pPr>
-              <a:t>3-Jan-25</a:t>
+              <a:t>4-Jan-25</a:t>
             </a:fld>
             <a:endParaRPr lang="en-US" dirty="0"/>
           </a:p>
@@ -5935,7 +5935,7 @@
             <a:fld id="{65E331A2-936F-4415-B2A7-7A973F13EE44}" type="datetime5">
               <a:rPr lang="en-US" smtClean="0"/>
               <a:pPr/>
-              <a:t>3-Jan-25</a:t>
+              <a:t>4-Jan-25</a:t>
             </a:fld>
             <a:endParaRPr lang="en-US" dirty="0"/>
           </a:p>
@@ -6191,7 +6191,7 @@
             <a:fld id="{966FD456-933D-482B-A38F-44A2D1FBACCD}" type="datetime5">
               <a:rPr lang="en-US" smtClean="0"/>
               <a:pPr/>
-              <a:t>3-Jan-25</a:t>
+              <a:t>4-Jan-25</a:t>
             </a:fld>
             <a:endParaRPr lang="en-US" dirty="0"/>
           </a:p>
@@ -6424,7 +6424,7 @@
             <a:fld id="{F2665F44-41B5-44CF-9451-A8CFAFD511C5}" type="datetime5">
               <a:rPr lang="en-US" smtClean="0"/>
               <a:pPr/>
-              <a:t>3-Jan-25</a:t>
+              <a:t>4-Jan-25</a:t>
             </a:fld>
             <a:endParaRPr lang="en-US" dirty="0"/>
           </a:p>
@@ -6573,7 +6573,7 @@
             <a:fld id="{6620F398-5194-4922-94CC-66A368E58A46}" type="datetime5">
               <a:rPr lang="en-US" smtClean="0"/>
               <a:pPr/>
-              <a:t>3-Jan-25</a:t>
+              <a:t>4-Jan-25</a:t>
             </a:fld>
             <a:endParaRPr lang="en-US" dirty="0"/>
           </a:p>
@@ -6732,7 +6732,7 @@
             <a:fld id="{44DA51E7-B80F-47BE-909C-C69C302A4ACA}" type="datetime5">
               <a:rPr lang="en-US" smtClean="0"/>
               <a:pPr/>
-              <a:t>3-Jan-25</a:t>
+              <a:t>4-Jan-25</a:t>
             </a:fld>
             <a:endParaRPr lang="en-US" dirty="0"/>
           </a:p>
@@ -6988,7 +6988,7 @@
               <a:pPr>
                 <a:defRPr/>
               </a:pPr>
-              <a:t>3-Jan-25</a:t>
+              <a:t>4-Jan-25</a:t>
             </a:fld>
             <a:endParaRPr lang="en-US" dirty="0"/>
           </a:p>
@@ -7365,7 +7365,7 @@
               <a:pPr>
                 <a:defRPr/>
               </a:pPr>
-              <a:t>3-Jan-25</a:t>
+              <a:t>4-Jan-25</a:t>
             </a:fld>
             <a:endParaRPr lang="en-US" dirty="0"/>
           </a:p>
@@ -7516,7 +7516,7 @@
               <a:pPr>
                 <a:defRPr/>
               </a:pPr>
-              <a:t>3-Jan-25</a:t>
+              <a:t>4-Jan-25</a:t>
             </a:fld>
             <a:endParaRPr lang="en-US" dirty="0"/>
           </a:p>
@@ -7608,7 +7608,7 @@
               <a:pPr>
                 <a:defRPr/>
               </a:pPr>
-              <a:t>3-Jan-25</a:t>
+              <a:t>4-Jan-25</a:t>
             </a:fld>
             <a:endParaRPr lang="en-US" dirty="0"/>
           </a:p>
@@ -7869,7 +7869,7 @@
               <a:pPr>
                 <a:defRPr/>
               </a:pPr>
-              <a:t>3-Jan-25</a:t>
+              <a:t>4-Jan-25</a:t>
             </a:fld>
             <a:endParaRPr lang="en-US" dirty="0"/>
           </a:p>
@@ -8486,7 +8486,7 @@
               <a:pPr>
                 <a:defRPr/>
               </a:pPr>
-              <a:t>3-Jan-25</a:t>
+              <a:t>4-Jan-25</a:t>
             </a:fld>
             <a:endParaRPr lang="en-US" dirty="0"/>
           </a:p>
@@ -8722,7 +8722,7 @@
               <a:pPr>
                 <a:defRPr/>
               </a:pPr>
-              <a:t>3-Jan-25</a:t>
+              <a:t>4-Jan-25</a:t>
             </a:fld>
             <a:endParaRPr lang="en-US" dirty="0"/>
           </a:p>
@@ -9294,7 +9294,7 @@
             <a:fld id="{6AAB0F85-54C5-4371-92E9-C441160297C0}" type="datetime5">
               <a:rPr lang="en-US" smtClean="0"/>
               <a:pPr/>
-              <a:t>3-Jan-25</a:t>
+              <a:t>4-Jan-25</a:t>
             </a:fld>
             <a:endParaRPr lang="en-US" dirty="0"/>
           </a:p>
@@ -9721,7 +9721,7 @@
             <a:fld id="{AF1A4985-C20B-43A0-A3C8-38EB8430E818}" type="datetime5">
               <a:rPr lang="en-US" smtClean="0"/>
               <a:pPr/>
-              <a:t>3-Jan-25</a:t>
+              <a:t>4-Jan-25</a:t>
             </a:fld>
             <a:endParaRPr lang="en-US" dirty="0"/>
           </a:p>
@@ -10097,7 +10097,7 @@
               <a:pPr>
                 <a:defRPr/>
               </a:pPr>
-              <a:t>3-Jan-25</a:t>
+              <a:t>4-Jan-25</a:t>
             </a:fld>
             <a:endParaRPr lang="en-US" dirty="0">
               <a:latin typeface="Times New Roman" panose="02020603050405020304" pitchFamily="18" charset="0"/>
@@ -10881,7 +10881,7 @@
               <a:pPr>
                 <a:defRPr/>
               </a:pPr>
-              <a:t>3-Jan-25</a:t>
+              <a:t>4-Jan-25</a:t>
             </a:fld>
             <a:endParaRPr lang="en-US" dirty="0"/>
           </a:p>
@@ -11152,7 +11152,7 @@
             <a:fld id="{E1413D5B-0279-47B2-AB44-E806A00ECAC5}" type="datetime5">
               <a:rPr lang="en-US" sz="1000" smtClean="0"/>
               <a:pPr/>
-              <a:t>3-Jan-25</a:t>
+              <a:t>4-Jan-25</a:t>
             </a:fld>
             <a:endParaRPr lang="en-IN" sz="1000" dirty="0"/>
           </a:p>
@@ -11259,7 +11259,7 @@
               <a:pPr>
                 <a:defRPr/>
               </a:pPr>
-              <a:t>3-Jan-25</a:t>
+              <a:t>4-Jan-25</a:t>
             </a:fld>
             <a:endParaRPr lang="en-US" dirty="0"/>
           </a:p>
@@ -11812,7 +11812,7 @@
               <a:pPr>
                 <a:defRPr/>
               </a:pPr>
-              <a:t>3-Jan-25</a:t>
+              <a:t>4-Jan-25</a:t>
             </a:fld>
             <a:endParaRPr lang="en-US" dirty="0"/>
           </a:p>
@@ -12143,7 +12143,7 @@
               <a:pPr>
                 <a:defRPr/>
               </a:pPr>
-              <a:t>3-Jan-25</a:t>
+              <a:t>4-Jan-25</a:t>
             </a:fld>
             <a:endParaRPr lang="en-US" dirty="0"/>
           </a:p>
@@ -12258,7 +12258,7 @@
               <a:pPr>
                 <a:defRPr/>
               </a:pPr>
-              <a:t>3-Jan-25</a:t>
+              <a:t>4-Jan-25</a:t>
             </a:fld>
             <a:endParaRPr lang="en-US" dirty="0"/>
           </a:p>
@@ -12357,7 +12357,7 @@
                 <a:latin typeface="Times New Roman" panose="02020603050405020304" pitchFamily="18" charset="0"/>
                 <a:cs typeface="Times New Roman" panose="02020603050405020304" pitchFamily="18" charset="0"/>
               </a:rPr>
-              <a:t>The Online Platform for Dessert Products simplifies ordering by allowing bulk and individual orders for customers. It features an easy interface to browse, check availability, and place orders.</a:t>
+              <a:t>The Online Platform for Dessert Products simplifies ordering by allowing bulk orders for customers. It features an easy interface to browse, check availability, and place orders.</a:t>
             </a:r>
           </a:p>
           <a:p>
@@ -12807,7 +12807,7 @@
             <a:fld id="{E1413D5B-0279-47B2-AB44-E806A00ECAC5}" type="datetime5">
               <a:rPr lang="en-US" sz="1000" smtClean="0"/>
               <a:pPr/>
-              <a:t>3-Jan-25</a:t>
+              <a:t>4-Jan-25</a:t>
             </a:fld>
             <a:endParaRPr lang="en-IN" sz="1000" dirty="0"/>
           </a:p>
@@ -13211,8 +13211,8 @@
         </p:nvSpPr>
         <p:spPr bwMode="auto">
           <a:xfrm>
-            <a:off x="1331640" y="1418293"/>
-            <a:ext cx="7344097" cy="2585323"/>
+            <a:off x="1331640" y="1233627"/>
+            <a:ext cx="7344097" cy="2954655"/>
           </a:xfrm>
           <a:prstGeom prst="rect">
             <a:avLst/>
@@ -13459,6 +13459,23 @@
               </a:rPr>
               <a:t>SOFTWARE :</a:t>
             </a:r>
+          </a:p>
+          <a:p>
+            <a:pPr marL="0" indent="0">
+              <a:spcBef>
+                <a:spcPct val="0"/>
+              </a:spcBef>
+              <a:buSzTx/>
+              <a:buNone/>
+            </a:pPr>
+            <a:endParaRPr kumimoji="0" lang="en-US" altLang="en-US" sz="2400" b="1" i="0" u="none" strike="noStrike" cap="none" normalizeH="0" baseline="0" dirty="0">
+              <a:ln>
+                <a:noFill/>
+              </a:ln>
+              <a:effectLst/>
+              <a:latin typeface="Times New Roman" panose="02020603050405020304" pitchFamily="18" charset="0"/>
+              <a:cs typeface="Times New Roman" panose="02020603050405020304" pitchFamily="18" charset="0"/>
+            </a:endParaRPr>
           </a:p>
           <a:p>
             <a:pPr lvl="1">
@@ -13930,7 +13947,7 @@
             <a:fld id="{E1413D5B-0279-47B2-AB44-E806A00ECAC5}" type="datetime5">
               <a:rPr lang="en-US" sz="1000" smtClean="0"/>
               <a:pPr/>
-              <a:t>3-Jan-25</a:t>
+              <a:t>4-Jan-25</a:t>
             </a:fld>
             <a:endParaRPr lang="en-IN" sz="1000" dirty="0"/>
           </a:p>
@@ -14037,7 +14054,7 @@
               <a:pPr>
                 <a:defRPr/>
               </a:pPr>
-              <a:t>3-Jan-25</a:t>
+              <a:t>4-Jan-25</a:t>
             </a:fld>
             <a:endParaRPr lang="en-US" dirty="0"/>
           </a:p>
@@ -14294,7 +14311,7 @@
               <a:pPr>
                 <a:defRPr/>
               </a:pPr>
-              <a:t>3-Jan-25</a:t>
+              <a:t>4-Jan-25</a:t>
             </a:fld>
             <a:endParaRPr lang="en-US" dirty="0"/>
           </a:p>
@@ -14439,7 +14456,7 @@
             <a:fld id="{E1413D5B-0279-47B2-AB44-E806A00ECAC5}" type="datetime5">
               <a:rPr lang="en-US" sz="1000" smtClean="0"/>
               <a:pPr/>
-              <a:t>3-Jan-25</a:t>
+              <a:t>4-Jan-25</a:t>
             </a:fld>
             <a:endParaRPr lang="en-IN" sz="1000" dirty="0"/>
           </a:p>
@@ -14582,7 +14599,7 @@
               <a:pPr>
                 <a:defRPr/>
               </a:pPr>
-              <a:t>3-Jan-25</a:t>
+              <a:t>4-Jan-25</a:t>
             </a:fld>
             <a:endParaRPr lang="en-US" dirty="0"/>
           </a:p>
@@ -14725,7 +14742,7 @@
               <a:pPr>
                 <a:defRPr/>
               </a:pPr>
-              <a:t>3-Jan-25</a:t>
+              <a:t>4-Jan-25</a:t>
             </a:fld>
             <a:endParaRPr lang="en-US" dirty="0"/>
           </a:p>
@@ -14733,10 +14750,10 @@
       </p:sp>
       <p:pic>
         <p:nvPicPr>
-          <p:cNvPr id="6" name="Picture 5">
+          <p:cNvPr id="5" name="Picture 4">
             <a:extLst>
               <a:ext uri="{FF2B5EF4-FFF2-40B4-BE49-F238E27FC236}">
-                <a16:creationId xmlns:a16="http://schemas.microsoft.com/office/drawing/2014/main" id="{EFAD1233-31AD-9983-4F24-CEFEAD3CBB82}"/>
+                <a16:creationId xmlns:a16="http://schemas.microsoft.com/office/drawing/2014/main" id="{DFBFC573-4F62-A87D-E909-4437E6B2EA3A}"/>
               </a:ext>
             </a:extLst>
           </p:cNvPr>
@@ -14759,8 +14776,8 @@
         </p:blipFill>
         <p:spPr>
           <a:xfrm>
-            <a:off x="1296632" y="1052736"/>
-            <a:ext cx="7163800" cy="5277587"/>
+            <a:off x="751942" y="971600"/>
+            <a:ext cx="7640116" cy="5334351"/>
           </a:xfrm>
           <a:prstGeom prst="rect">
             <a:avLst/>

</xml_diff>